<commit_message>
added stack details in ppt
</commit_message>
<xml_diff>
--- a/Northwest hunt.pptx
+++ b/Northwest hunt.pptx
@@ -8,13 +8,14 @@
     <p:sldId id="256" r:id="rId2"/>
     <p:sldId id="257" r:id="rId3"/>
     <p:sldId id="258" r:id="rId4"/>
-    <p:sldId id="260" r:id="rId5"/>
-    <p:sldId id="261" r:id="rId6"/>
-    <p:sldId id="262" r:id="rId7"/>
-    <p:sldId id="263" r:id="rId8"/>
-    <p:sldId id="264" r:id="rId9"/>
-    <p:sldId id="265" r:id="rId10"/>
-    <p:sldId id="266" r:id="rId11"/>
+    <p:sldId id="267" r:id="rId5"/>
+    <p:sldId id="260" r:id="rId6"/>
+    <p:sldId id="261" r:id="rId7"/>
+    <p:sldId id="262" r:id="rId8"/>
+    <p:sldId id="263" r:id="rId9"/>
+    <p:sldId id="264" r:id="rId10"/>
+    <p:sldId id="265" r:id="rId11"/>
+    <p:sldId id="266" r:id="rId12"/>
   </p:sldIdLst>
   <p:sldSz cx="12192000" cy="6858000"/>
   <p:notesSz cx="6858000" cy="9144000"/>
@@ -7795,6 +7796,94 @@
           <a:chExt cx="0" cy="0"/>
         </a:xfrm>
       </p:grpSpPr>
+      <p:sp>
+        <p:nvSpPr>
+          <p:cNvPr id="3" name="Content Placeholder 2"/>
+          <p:cNvSpPr>
+            <a:spLocks noGrp="1"/>
+          </p:cNvSpPr>
+          <p:nvPr>
+            <p:ph idx="1"/>
+          </p:nvPr>
+        </p:nvSpPr>
+        <p:spPr>
+          <a:xfrm>
+            <a:off x="1894113" y="875211"/>
+            <a:ext cx="9731829" cy="5643155"/>
+          </a:xfrm>
+        </p:spPr>
+        <p:txBody>
+          <a:bodyPr/>
+          <a:lstStyle/>
+          <a:p>
+            <a:pPr>
+              <a:buFont typeface="Wingdings" panose="05000000000000000000" pitchFamily="2" charset="2"/>
+              <a:buChar char="q"/>
+            </a:pPr>
+            <a:r>
+              <a:rPr lang="en-US" sz="2400" dirty="0" smtClean="0">
+                <a:latin typeface="Times New Roman" panose="02020603050405020304" pitchFamily="18" charset="0"/>
+                <a:cs typeface="Times New Roman" panose="02020603050405020304" pitchFamily="18" charset="0"/>
+              </a:rPr>
+              <a:t>When the user is inside the quest location, a notification will appear on the screen showing that they have reached the location and will be given two options to start the game from the beginning or close the notification.</a:t>
+            </a:r>
+          </a:p>
+          <a:p>
+            <a:pPr>
+              <a:buFont typeface="Wingdings" panose="05000000000000000000" pitchFamily="2" charset="2"/>
+              <a:buChar char="q"/>
+            </a:pPr>
+            <a:endParaRPr lang="en-US" sz="2400" dirty="0" smtClean="0">
+              <a:latin typeface="Times New Roman" panose="02020603050405020304" pitchFamily="18" charset="0"/>
+              <a:cs typeface="Times New Roman" panose="02020603050405020304" pitchFamily="18" charset="0"/>
+            </a:endParaRPr>
+          </a:p>
+          <a:p>
+            <a:pPr>
+              <a:buFont typeface="Wingdings" panose="05000000000000000000" pitchFamily="2" charset="2"/>
+              <a:buChar char="q"/>
+            </a:pPr>
+            <a:endParaRPr lang="en-US" dirty="0"/>
+          </a:p>
+          <a:p>
+            <a:pPr>
+              <a:buFont typeface="Wingdings" panose="05000000000000000000" pitchFamily="2" charset="2"/>
+              <a:buChar char="q"/>
+            </a:pPr>
+            <a:endParaRPr lang="en-US" dirty="0"/>
+          </a:p>
+        </p:txBody>
+      </p:sp>
+    </p:spTree>
+    <p:extLst>
+      <p:ext uri="{BB962C8B-B14F-4D97-AF65-F5344CB8AC3E}">
+        <p14:creationId xmlns:p14="http://schemas.microsoft.com/office/powerpoint/2010/main" val="846717987"/>
+      </p:ext>
+    </p:extLst>
+  </p:cSld>
+  <p:clrMapOvr>
+    <a:masterClrMapping/>
+  </p:clrMapOvr>
+</p:sld>
+</file>
+
+<file path=ppt/slides/slide11.xml><?xml version="1.0" encoding="utf-8"?>
+<p:sld xmlns:a="http://schemas.openxmlformats.org/drawingml/2006/main" xmlns:r="http://schemas.openxmlformats.org/officeDocument/2006/relationships" xmlns:p="http://schemas.openxmlformats.org/presentationml/2006/main">
+  <p:cSld>
+    <p:spTree>
+      <p:nvGrpSpPr>
+        <p:cNvPr id="1" name=""/>
+        <p:cNvGrpSpPr/>
+        <p:nvPr/>
+      </p:nvGrpSpPr>
+      <p:grpSpPr>
+        <a:xfrm>
+          <a:off x="0" y="0"/>
+          <a:ext cx="0" cy="0"/>
+          <a:chOff x="0" y="0"/>
+          <a:chExt cx="0" cy="0"/>
+        </a:xfrm>
+      </p:grpSpPr>
       <p:pic>
         <p:nvPicPr>
           <p:cNvPr id="4" name="Content Placeholder 3"/>
@@ -8188,6 +8277,170 @@
       </p:grpSpPr>
       <p:sp>
         <p:nvSpPr>
+          <p:cNvPr id="2" name="Title 1"/>
+          <p:cNvSpPr>
+            <a:spLocks noGrp="1"/>
+          </p:cNvSpPr>
+          <p:nvPr>
+            <p:ph type="title"/>
+          </p:nvPr>
+        </p:nvSpPr>
+        <p:spPr>
+          <a:xfrm>
+            <a:off x="2592926" y="1107436"/>
+            <a:ext cx="7452412" cy="616861"/>
+          </a:xfrm>
+        </p:spPr>
+        <p:txBody>
+          <a:bodyPr>
+            <a:normAutofit fontScale="90000"/>
+          </a:bodyPr>
+          <a:lstStyle/>
+          <a:p>
+            <a:pPr algn="ctr"/>
+            <a:r>
+              <a:rPr lang="en-US" dirty="0" smtClean="0"/>
+              <a:t>    Stack</a:t>
+            </a:r>
+            <a:endParaRPr lang="en-US" dirty="0"/>
+          </a:p>
+        </p:txBody>
+      </p:sp>
+      <p:sp>
+        <p:nvSpPr>
+          <p:cNvPr id="3" name="Content Placeholder 2"/>
+          <p:cNvSpPr>
+            <a:spLocks noGrp="1"/>
+          </p:cNvSpPr>
+          <p:nvPr>
+            <p:ph idx="1"/>
+          </p:nvPr>
+        </p:nvSpPr>
+        <p:spPr>
+          <a:xfrm>
+            <a:off x="2592926" y="2063930"/>
+            <a:ext cx="7887199" cy="3775167"/>
+          </a:xfrm>
+        </p:spPr>
+        <p:txBody>
+          <a:bodyPr/>
+          <a:lstStyle/>
+          <a:p>
+            <a:endParaRPr lang="en-US" dirty="0" smtClean="0"/>
+          </a:p>
+          <a:p>
+            <a:r>
+              <a:rPr lang="en-US" dirty="0" smtClean="0"/>
+              <a:t>Web </a:t>
+            </a:r>
+            <a:r>
+              <a:rPr lang="en-US" dirty="0"/>
+              <a:t>Framework : </a:t>
+            </a:r>
+            <a:r>
+              <a:rPr lang="en-US" dirty="0" smtClean="0"/>
+              <a:t>Express</a:t>
+            </a:r>
+          </a:p>
+          <a:p>
+            <a:r>
+              <a:rPr lang="en-US" dirty="0"/>
+              <a:t>Platform: Node(Version - v15.1.0</a:t>
+            </a:r>
+            <a:r>
+              <a:rPr lang="en-US" dirty="0" smtClean="0"/>
+              <a:t>)</a:t>
+            </a:r>
+            <a:endParaRPr lang="en-US" dirty="0"/>
+          </a:p>
+          <a:p>
+            <a:r>
+              <a:rPr lang="en-US" dirty="0"/>
+              <a:t>View engine : EJS</a:t>
+            </a:r>
+          </a:p>
+          <a:p>
+            <a:r>
+              <a:rPr lang="en-US" dirty="0"/>
+              <a:t>ORM(Object Relational Mapping) : </a:t>
+            </a:r>
+            <a:r>
+              <a:rPr lang="en-US" dirty="0" err="1"/>
+              <a:t>Sequelize</a:t>
+            </a:r>
+            <a:endParaRPr lang="en-US" dirty="0"/>
+          </a:p>
+          <a:p>
+            <a:r>
+              <a:rPr lang="en-US" dirty="0"/>
+              <a:t>Data store: PostgreSQL</a:t>
+            </a:r>
+          </a:p>
+          <a:p>
+            <a:r>
+              <a:rPr lang="en-US" dirty="0"/>
+              <a:t>API : Google Maps</a:t>
+            </a:r>
+          </a:p>
+          <a:p>
+            <a:r>
+              <a:rPr lang="en-US" dirty="0"/>
+              <a:t>Coding standards : Enforce </a:t>
+            </a:r>
+            <a:r>
+              <a:rPr lang="en-US" dirty="0" err="1"/>
+              <a:t>AirBnB</a:t>
+            </a:r>
+            <a:r>
+              <a:rPr lang="en-US" dirty="0"/>
+              <a:t>/Prettier/</a:t>
+            </a:r>
+            <a:r>
+              <a:rPr lang="en-US" dirty="0" err="1"/>
+              <a:t>ESlint</a:t>
+            </a:r>
+            <a:endParaRPr lang="en-US" dirty="0"/>
+          </a:p>
+          <a:p>
+            <a:pPr marL="0" indent="0">
+              <a:buNone/>
+            </a:pPr>
+            <a:endParaRPr lang="en-US" dirty="0"/>
+          </a:p>
+        </p:txBody>
+      </p:sp>
+    </p:spTree>
+    <p:extLst>
+      <p:ext uri="{BB962C8B-B14F-4D97-AF65-F5344CB8AC3E}">
+        <p14:creationId xmlns:p14="http://schemas.microsoft.com/office/powerpoint/2010/main" val="280988428"/>
+      </p:ext>
+    </p:extLst>
+  </p:cSld>
+  <p:clrMapOvr>
+    <a:masterClrMapping/>
+  </p:clrMapOvr>
+</p:sld>
+</file>
+
+<file path=ppt/slides/slide5.xml><?xml version="1.0" encoding="utf-8"?>
+<p:sld xmlns:a="http://schemas.openxmlformats.org/drawingml/2006/main" xmlns:r="http://schemas.openxmlformats.org/officeDocument/2006/relationships" xmlns:p="http://schemas.openxmlformats.org/presentationml/2006/main">
+  <p:cSld>
+    <p:spTree>
+      <p:nvGrpSpPr>
+        <p:cNvPr id="1" name=""/>
+        <p:cNvGrpSpPr/>
+        <p:nvPr/>
+      </p:nvGrpSpPr>
+      <p:grpSpPr>
+        <a:xfrm>
+          <a:off x="0" y="0"/>
+          <a:ext cx="0" cy="0"/>
+          <a:chOff x="0" y="0"/>
+          <a:chExt cx="0" cy="0"/>
+        </a:xfrm>
+      </p:grpSpPr>
+      <p:sp>
+        <p:nvSpPr>
           <p:cNvPr id="3" name="Content Placeholder 2"/>
           <p:cNvSpPr>
             <a:spLocks noGrp="1"/>
@@ -8315,7 +8568,7 @@
 </p:sld>
 </file>
 
-<file path=ppt/slides/slide5.xml><?xml version="1.0" encoding="utf-8"?>
+<file path=ppt/slides/slide6.xml><?xml version="1.0" encoding="utf-8"?>
 <p:sld xmlns:a="http://schemas.openxmlformats.org/drawingml/2006/main" xmlns:r="http://schemas.openxmlformats.org/officeDocument/2006/relationships" xmlns:p="http://schemas.openxmlformats.org/presentationml/2006/main">
   <p:cSld>
     <p:spTree>
@@ -8431,7 +8684,7 @@
 </p:sld>
 </file>
 
-<file path=ppt/slides/slide6.xml><?xml version="1.0" encoding="utf-8"?>
+<file path=ppt/slides/slide7.xml><?xml version="1.0" encoding="utf-8"?>
 <p:sld xmlns:a="http://schemas.openxmlformats.org/drawingml/2006/main" xmlns:r="http://schemas.openxmlformats.org/officeDocument/2006/relationships" xmlns:p="http://schemas.openxmlformats.org/presentationml/2006/main">
   <p:cSld>
     <p:spTree>
@@ -8539,7 +8792,7 @@
 </p:sld>
 </file>
 
-<file path=ppt/slides/slide7.xml><?xml version="1.0" encoding="utf-8"?>
+<file path=ppt/slides/slide8.xml><?xml version="1.0" encoding="utf-8"?>
 <p:sld xmlns:a="http://schemas.openxmlformats.org/drawingml/2006/main" xmlns:r="http://schemas.openxmlformats.org/officeDocument/2006/relationships" xmlns:p="http://schemas.openxmlformats.org/presentationml/2006/main">
   <p:cSld>
     <p:spTree>
@@ -8664,7 +8917,7 @@
 </p:sld>
 </file>
 
-<file path=ppt/slides/slide8.xml><?xml version="1.0" encoding="utf-8"?>
+<file path=ppt/slides/slide9.xml><?xml version="1.0" encoding="utf-8"?>
 <p:sld xmlns:a="http://schemas.openxmlformats.org/drawingml/2006/main" xmlns:r="http://schemas.openxmlformats.org/officeDocument/2006/relationships" xmlns:p="http://schemas.openxmlformats.org/presentationml/2006/main">
   <p:cSld>
     <p:spTree>
@@ -8790,94 +9043,6 @@
     <p:extLst>
       <p:ext uri="{BB962C8B-B14F-4D97-AF65-F5344CB8AC3E}">
         <p14:creationId xmlns:p14="http://schemas.microsoft.com/office/powerpoint/2010/main" val="262407128"/>
-      </p:ext>
-    </p:extLst>
-  </p:cSld>
-  <p:clrMapOvr>
-    <a:masterClrMapping/>
-  </p:clrMapOvr>
-</p:sld>
-</file>
-
-<file path=ppt/slides/slide9.xml><?xml version="1.0" encoding="utf-8"?>
-<p:sld xmlns:a="http://schemas.openxmlformats.org/drawingml/2006/main" xmlns:r="http://schemas.openxmlformats.org/officeDocument/2006/relationships" xmlns:p="http://schemas.openxmlformats.org/presentationml/2006/main">
-  <p:cSld>
-    <p:spTree>
-      <p:nvGrpSpPr>
-        <p:cNvPr id="1" name=""/>
-        <p:cNvGrpSpPr/>
-        <p:nvPr/>
-      </p:nvGrpSpPr>
-      <p:grpSpPr>
-        <a:xfrm>
-          <a:off x="0" y="0"/>
-          <a:ext cx="0" cy="0"/>
-          <a:chOff x="0" y="0"/>
-          <a:chExt cx="0" cy="0"/>
-        </a:xfrm>
-      </p:grpSpPr>
-      <p:sp>
-        <p:nvSpPr>
-          <p:cNvPr id="3" name="Content Placeholder 2"/>
-          <p:cNvSpPr>
-            <a:spLocks noGrp="1"/>
-          </p:cNvSpPr>
-          <p:nvPr>
-            <p:ph idx="1"/>
-          </p:nvPr>
-        </p:nvSpPr>
-        <p:spPr>
-          <a:xfrm>
-            <a:off x="1894113" y="875211"/>
-            <a:ext cx="9731829" cy="5643155"/>
-          </a:xfrm>
-        </p:spPr>
-        <p:txBody>
-          <a:bodyPr/>
-          <a:lstStyle/>
-          <a:p>
-            <a:pPr>
-              <a:buFont typeface="Wingdings" panose="05000000000000000000" pitchFamily="2" charset="2"/>
-              <a:buChar char="q"/>
-            </a:pPr>
-            <a:r>
-              <a:rPr lang="en-US" sz="2400" dirty="0" smtClean="0">
-                <a:latin typeface="Times New Roman" panose="02020603050405020304" pitchFamily="18" charset="0"/>
-                <a:cs typeface="Times New Roman" panose="02020603050405020304" pitchFamily="18" charset="0"/>
-              </a:rPr>
-              <a:t>When the user is inside the quest location, a notification will appear on the screen showing that they have reached the location and will be given two options to start the game from the beginning or close the notification.</a:t>
-            </a:r>
-          </a:p>
-          <a:p>
-            <a:pPr>
-              <a:buFont typeface="Wingdings" panose="05000000000000000000" pitchFamily="2" charset="2"/>
-              <a:buChar char="q"/>
-            </a:pPr>
-            <a:endParaRPr lang="en-US" sz="2400" dirty="0" smtClean="0">
-              <a:latin typeface="Times New Roman" panose="02020603050405020304" pitchFamily="18" charset="0"/>
-              <a:cs typeface="Times New Roman" panose="02020603050405020304" pitchFamily="18" charset="0"/>
-            </a:endParaRPr>
-          </a:p>
-          <a:p>
-            <a:pPr>
-              <a:buFont typeface="Wingdings" panose="05000000000000000000" pitchFamily="2" charset="2"/>
-              <a:buChar char="q"/>
-            </a:pPr>
-            <a:endParaRPr lang="en-US" dirty="0"/>
-          </a:p>
-          <a:p>
-            <a:pPr>
-              <a:buFont typeface="Wingdings" panose="05000000000000000000" pitchFamily="2" charset="2"/>
-              <a:buChar char="q"/>
-            </a:pPr>
-            <a:endParaRPr lang="en-US" dirty="0"/>
-          </a:p>
-        </p:txBody>
-      </p:sp>
-    </p:spTree>
-    <p:extLst>
-      <p:ext uri="{BB962C8B-B14F-4D97-AF65-F5344CB8AC3E}">
-        <p14:creationId xmlns:p14="http://schemas.microsoft.com/office/powerpoint/2010/main" val="846717987"/>
       </p:ext>
     </p:extLst>
   </p:cSld>

</xml_diff>